<commit_message>
Adaugat modificari pentru A3
</commit_message>
<xml_diff>
--- a/interpreter_project_structure.pptx
+++ b/interpreter_project_structure.pptx
@@ -105,6 +105,11 @@
       </a:defRPr>
     </a:lvl9pPr>
   </p:defaultTextStyle>
+  <p:extLst>
+    <p:ext uri="{EFAFB233-063F-42B5-8137-9DF3F51BA10A}">
+      <p15:sldGuideLst xmlns:p15="http://schemas.microsoft.com/office/powerpoint/2012/main"/>
+    </p:ext>
+  </p:extLst>
 </p:presentation>
 </file>
 
@@ -257,7 +262,7 @@
           <a:p>
             <a:fld id="{B4F30407-742D-4F8B-AD3E-C3D7980839F8}" type="datetimeFigureOut">
               <a:rPr lang="ro-RO" smtClean="0"/>
-              <a:t>26.10.2022</a:t>
+              <a:t>02.11.2022</a:t>
             </a:fld>
             <a:endParaRPr lang="ro-RO"/>
           </a:p>
@@ -457,7 +462,7 @@
           <a:p>
             <a:fld id="{B4F30407-742D-4F8B-AD3E-C3D7980839F8}" type="datetimeFigureOut">
               <a:rPr lang="ro-RO" smtClean="0"/>
-              <a:t>26.10.2022</a:t>
+              <a:t>02.11.2022</a:t>
             </a:fld>
             <a:endParaRPr lang="ro-RO"/>
           </a:p>
@@ -667,7 +672,7 @@
           <a:p>
             <a:fld id="{B4F30407-742D-4F8B-AD3E-C3D7980839F8}" type="datetimeFigureOut">
               <a:rPr lang="ro-RO" smtClean="0"/>
-              <a:t>26.10.2022</a:t>
+              <a:t>02.11.2022</a:t>
             </a:fld>
             <a:endParaRPr lang="ro-RO"/>
           </a:p>
@@ -867,7 +872,7 @@
           <a:p>
             <a:fld id="{B4F30407-742D-4F8B-AD3E-C3D7980839F8}" type="datetimeFigureOut">
               <a:rPr lang="ro-RO" smtClean="0"/>
-              <a:t>26.10.2022</a:t>
+              <a:t>02.11.2022</a:t>
             </a:fld>
             <a:endParaRPr lang="ro-RO"/>
           </a:p>
@@ -1143,7 +1148,7 @@
           <a:p>
             <a:fld id="{B4F30407-742D-4F8B-AD3E-C3D7980839F8}" type="datetimeFigureOut">
               <a:rPr lang="ro-RO" smtClean="0"/>
-              <a:t>26.10.2022</a:t>
+              <a:t>02.11.2022</a:t>
             </a:fld>
             <a:endParaRPr lang="ro-RO"/>
           </a:p>
@@ -1411,7 +1416,7 @@
           <a:p>
             <a:fld id="{B4F30407-742D-4F8B-AD3E-C3D7980839F8}" type="datetimeFigureOut">
               <a:rPr lang="ro-RO" smtClean="0"/>
-              <a:t>26.10.2022</a:t>
+              <a:t>02.11.2022</a:t>
             </a:fld>
             <a:endParaRPr lang="ro-RO"/>
           </a:p>
@@ -1826,7 +1831,7 @@
           <a:p>
             <a:fld id="{B4F30407-742D-4F8B-AD3E-C3D7980839F8}" type="datetimeFigureOut">
               <a:rPr lang="ro-RO" smtClean="0"/>
-              <a:t>26.10.2022</a:t>
+              <a:t>02.11.2022</a:t>
             </a:fld>
             <a:endParaRPr lang="ro-RO"/>
           </a:p>
@@ -1968,7 +1973,7 @@
           <a:p>
             <a:fld id="{B4F30407-742D-4F8B-AD3E-C3D7980839F8}" type="datetimeFigureOut">
               <a:rPr lang="ro-RO" smtClean="0"/>
-              <a:t>26.10.2022</a:t>
+              <a:t>02.11.2022</a:t>
             </a:fld>
             <a:endParaRPr lang="ro-RO"/>
           </a:p>
@@ -2081,7 +2086,7 @@
           <a:p>
             <a:fld id="{B4F30407-742D-4F8B-AD3E-C3D7980839F8}" type="datetimeFigureOut">
               <a:rPr lang="ro-RO" smtClean="0"/>
-              <a:t>26.10.2022</a:t>
+              <a:t>02.11.2022</a:t>
             </a:fld>
             <a:endParaRPr lang="ro-RO"/>
           </a:p>
@@ -2394,7 +2399,7 @@
           <a:p>
             <a:fld id="{B4F30407-742D-4F8B-AD3E-C3D7980839F8}" type="datetimeFigureOut">
               <a:rPr lang="ro-RO" smtClean="0"/>
-              <a:t>26.10.2022</a:t>
+              <a:t>02.11.2022</a:t>
             </a:fld>
             <a:endParaRPr lang="ro-RO"/>
           </a:p>
@@ -2683,7 +2688,7 @@
           <a:p>
             <a:fld id="{B4F30407-742D-4F8B-AD3E-C3D7980839F8}" type="datetimeFigureOut">
               <a:rPr lang="ro-RO" smtClean="0"/>
-              <a:t>26.10.2022</a:t>
+              <a:t>02.11.2022</a:t>
             </a:fld>
             <a:endParaRPr lang="ro-RO"/>
           </a:p>
@@ -2926,7 +2931,7 @@
           <a:p>
             <a:fld id="{B4F30407-742D-4F8B-AD3E-C3D7980839F8}" type="datetimeFigureOut">
               <a:rPr lang="ro-RO" smtClean="0"/>
-              <a:t>26.10.2022</a:t>
+              <a:t>02.11.2022</a:t>
             </a:fld>
             <a:endParaRPr lang="ro-RO"/>
           </a:p>
@@ -3507,7 +3512,7 @@
         </p:nvSpPr>
         <p:spPr>
           <a:xfrm>
-            <a:off x="2245033" y="1168400"/>
+            <a:off x="2376413" y="1386465"/>
             <a:ext cx="1845139" cy="1417368"/>
           </a:xfrm>
           <a:prstGeom prst="rect">
@@ -3794,7 +3799,7 @@
         <p:spPr>
           <a:xfrm flipH="1" flipV="1">
             <a:off x="1270000" y="939800"/>
-            <a:ext cx="1897603" cy="228600"/>
+            <a:ext cx="2028983" cy="446665"/>
           </a:xfrm>
           <a:prstGeom prst="straightConnector1">
             <a:avLst/>
@@ -3876,8 +3881,8 @@
         </p:nvSpPr>
         <p:spPr>
           <a:xfrm>
-            <a:off x="9495365" y="237067"/>
-            <a:ext cx="2027767" cy="1278467"/>
+            <a:off x="9621580" y="138112"/>
+            <a:ext cx="2027767" cy="1456266"/>
           </a:xfrm>
           <a:prstGeom prst="rect">
             <a:avLst/>
@@ -3956,7 +3961,41 @@
               <a:rPr lang="en-US" dirty="0"/>
               <a:t>: Stack</a:t>
             </a:r>
-            <a:endParaRPr lang="ro-RO" dirty="0"/>
+          </a:p>
+          <a:p>
+            <a:pPr marL="285750" indent="-285750" algn="ctr">
+              <a:buFontTx/>
+              <a:buChar char="-"/>
+            </a:pPr>
+            <a:r>
+              <a:rPr lang="en-US" dirty="0" err="1">
+                <a:highlight>
+                  <a:srgbClr val="FF0000"/>
+                </a:highlight>
+              </a:rPr>
+              <a:t>fileTable</a:t>
+            </a:r>
+            <a:r>
+              <a:rPr lang="en-US" dirty="0">
+                <a:highlight>
+                  <a:srgbClr val="FF0000"/>
+                </a:highlight>
+              </a:rPr>
+              <a:t>: </a:t>
+            </a:r>
+            <a:r>
+              <a:rPr lang="en-US" dirty="0" err="1">
+                <a:highlight>
+                  <a:srgbClr val="FF0000"/>
+                </a:highlight>
+              </a:rPr>
+              <a:t>Dict</a:t>
+            </a:r>
+            <a:endParaRPr lang="ro-RO" dirty="0">
+              <a:highlight>
+                <a:srgbClr val="FF0000"/>
+              </a:highlight>
+            </a:endParaRPr>
           </a:p>
         </p:txBody>
       </p:sp>
@@ -4010,7 +4049,7 @@
         </p:nvSpPr>
         <p:spPr>
           <a:xfrm>
-            <a:off x="1930400" y="4776331"/>
+            <a:off x="372581" y="2782103"/>
             <a:ext cx="343364" cy="369332"/>
           </a:xfrm>
           <a:prstGeom prst="rect">
@@ -4103,8 +4142,8 @@
         </p:nvSpPr>
         <p:spPr>
           <a:xfrm>
-            <a:off x="4612834" y="1417935"/>
-            <a:ext cx="1818977" cy="1417368"/>
+            <a:off x="4767961" y="1417935"/>
+            <a:ext cx="1271472" cy="753648"/>
           </a:xfrm>
           <a:prstGeom prst="rect">
             <a:avLst/>
@@ -4137,21 +4176,13 @@
             </a:r>
             <a:r>
               <a:rPr lang="en-US" dirty="0"/>
-              <a:t> (ex. a, </a:t>
-            </a:r>
-            <a:r>
-              <a:rPr lang="en-US" dirty="0" err="1"/>
-              <a:t>valoare</a:t>
-            </a:r>
-            <a:r>
-              <a:rPr lang="en-US" dirty="0"/>
-              <a:t>, x…)</a:t>
-            </a:r>
-          </a:p>
-          <a:p>
-            <a:pPr algn="ctr"/>
-            <a:r>
-              <a:rPr lang="en-US" dirty="0"/>
+              <a:t> </a:t>
+            </a:r>
+          </a:p>
+          <a:p>
+            <a:pPr algn="ctr"/>
+            <a:r>
+              <a:rPr lang="en-US" sz="1100" dirty="0"/>
               <a:t>-String id</a:t>
             </a:r>
           </a:p>
@@ -4179,8 +4210,8 @@
         </p:nvSpPr>
         <p:spPr>
           <a:xfrm>
-            <a:off x="7944467" y="1577081"/>
-            <a:ext cx="1527340" cy="1140719"/>
+            <a:off x="8486709" y="1444602"/>
+            <a:ext cx="948942" cy="730422"/>
           </a:xfrm>
           <a:prstGeom prst="rect">
             <a:avLst/>
@@ -4211,15 +4242,12 @@
               <a:rPr lang="en-US" dirty="0" err="1"/>
               <a:t>ValExp</a:t>
             </a:r>
-            <a:r>
-              <a:rPr lang="en-US" dirty="0"/>
-              <a:t> (true, 2, 0…)</a:t>
-            </a:r>
-          </a:p>
-          <a:p>
-            <a:pPr algn="ctr"/>
-            <a:r>
-              <a:rPr lang="en-US" dirty="0"/>
+            <a:endParaRPr lang="en-US" dirty="0"/>
+          </a:p>
+          <a:p>
+            <a:pPr algn="ctr"/>
+            <a:r>
+              <a:rPr lang="en-US" sz="1000" dirty="0"/>
               <a:t>-Value</a:t>
             </a:r>
           </a:p>
@@ -4247,8 +4275,8 @@
         </p:nvSpPr>
         <p:spPr>
           <a:xfrm>
-            <a:off x="6052166" y="2863097"/>
-            <a:ext cx="2033499" cy="1652834"/>
+            <a:off x="6147085" y="1853510"/>
+            <a:ext cx="1470594" cy="1165963"/>
           </a:xfrm>
           <a:prstGeom prst="rect">
             <a:avLst/>
@@ -4279,29 +4307,26 @@
               <a:rPr lang="en-US" dirty="0" err="1"/>
               <a:t>ArithExp</a:t>
             </a:r>
-            <a:r>
-              <a:rPr lang="en-US" dirty="0"/>
-              <a:t> ((2*3)+a…)</a:t>
-            </a:r>
-          </a:p>
-          <a:p>
-            <a:pPr algn="ctr"/>
-            <a:r>
-              <a:rPr lang="en-US" dirty="0"/>
+            <a:endParaRPr lang="en-US" dirty="0"/>
+          </a:p>
+          <a:p>
+            <a:pPr algn="ctr"/>
+            <a:r>
+              <a:rPr lang="en-US" sz="1100" dirty="0"/>
               <a:t>-Exp</a:t>
             </a:r>
           </a:p>
           <a:p>
             <a:pPr algn="ctr"/>
             <a:r>
-              <a:rPr lang="en-US" dirty="0"/>
+              <a:rPr lang="en-US" sz="1100" dirty="0"/>
               <a:t>-Exp</a:t>
             </a:r>
           </a:p>
           <a:p>
             <a:pPr algn="ctr"/>
             <a:r>
-              <a:rPr lang="en-US" dirty="0"/>
+              <a:rPr lang="en-US" sz="1100" dirty="0"/>
               <a:t>-type: Int (+, -, *, /)</a:t>
             </a:r>
           </a:p>
@@ -4329,8 +4354,8 @@
         </p:nvSpPr>
         <p:spPr>
           <a:xfrm>
-            <a:off x="8221156" y="2961501"/>
-            <a:ext cx="1735666" cy="1652834"/>
+            <a:off x="7744046" y="2400790"/>
+            <a:ext cx="1320800" cy="1017832"/>
           </a:xfrm>
           <a:prstGeom prst="rect">
             <a:avLst/>
@@ -4361,29 +4386,26 @@
               <a:rPr lang="en-US" dirty="0" err="1"/>
               <a:t>LogicExp</a:t>
             </a:r>
-            <a:r>
-              <a:rPr lang="en-US" dirty="0"/>
-              <a:t> (a||true...)</a:t>
-            </a:r>
-          </a:p>
-          <a:p>
-            <a:pPr algn="ctr"/>
-            <a:r>
-              <a:rPr lang="en-US" dirty="0"/>
+            <a:endParaRPr lang="en-US" dirty="0"/>
+          </a:p>
+          <a:p>
+            <a:pPr algn="ctr"/>
+            <a:r>
+              <a:rPr lang="en-US" sz="1100" dirty="0"/>
               <a:t>-Exp</a:t>
             </a:r>
           </a:p>
           <a:p>
             <a:pPr algn="ctr"/>
             <a:r>
-              <a:rPr lang="en-US" dirty="0"/>
+              <a:rPr lang="en-US" sz="1100" dirty="0"/>
               <a:t>-Exp</a:t>
             </a:r>
           </a:p>
           <a:p>
             <a:pPr algn="ctr"/>
             <a:r>
-              <a:rPr lang="en-US" dirty="0"/>
+              <a:rPr lang="en-US" sz="1100" dirty="0"/>
               <a:t>-type: Int (&amp;, |)</a:t>
             </a:r>
           </a:p>
@@ -4415,8 +4437,8 @@
         </p:nvCxnSpPr>
         <p:spPr>
           <a:xfrm flipV="1">
-            <a:off x="5522323" y="1327202"/>
-            <a:ext cx="1824493" cy="90733"/>
+            <a:off x="5403697" y="1327202"/>
+            <a:ext cx="1943119" cy="90733"/>
           </a:xfrm>
           <a:prstGeom prst="straightConnector1">
             <a:avLst/>
@@ -4458,8 +4480,8 @@
         </p:nvCxnSpPr>
         <p:spPr>
           <a:xfrm flipV="1">
-            <a:off x="7068916" y="1327202"/>
-            <a:ext cx="277900" cy="1535895"/>
+            <a:off x="6882382" y="1327202"/>
+            <a:ext cx="464434" cy="526308"/>
           </a:xfrm>
           <a:prstGeom prst="straightConnector1">
             <a:avLst/>
@@ -4502,7 +4524,7 @@
         <p:spPr>
           <a:xfrm flipH="1" flipV="1">
             <a:off x="7346816" y="1327202"/>
-            <a:ext cx="1742173" cy="1634299"/>
+            <a:ext cx="1057630" cy="1073588"/>
           </a:xfrm>
           <a:prstGeom prst="straightConnector1">
             <a:avLst/>
@@ -4545,7 +4567,7 @@
         <p:spPr>
           <a:xfrm flipH="1" flipV="1">
             <a:off x="7346816" y="1327202"/>
-            <a:ext cx="1361321" cy="249879"/>
+            <a:ext cx="1614364" cy="117400"/>
           </a:xfrm>
           <a:prstGeom prst="straightConnector1">
             <a:avLst/>
@@ -4616,6 +4638,25 @@
               <a:t>Type</a:t>
             </a:r>
           </a:p>
+          <a:p>
+            <a:pPr algn="ctr"/>
+            <a:r>
+              <a:rPr lang="en-US" sz="1000" dirty="0" err="1">
+                <a:highlight>
+                  <a:srgbClr val="FF0000"/>
+                </a:highlight>
+              </a:rPr>
+              <a:t>getDefaultValue</a:t>
+            </a:r>
+            <a:r>
+              <a:rPr lang="en-US" sz="1000" dirty="0">
+                <a:highlight>
+                  <a:srgbClr val="FF0000"/>
+                </a:highlight>
+              </a:rPr>
+              <a:t>()</a:t>
+            </a:r>
+          </a:p>
         </p:txBody>
       </p:sp>
       <p:sp>
@@ -4632,7 +4673,7 @@
         </p:nvSpPr>
         <p:spPr>
           <a:xfrm>
-            <a:off x="3990658" y="5207446"/>
+            <a:off x="4278526" y="5207446"/>
             <a:ext cx="1040670" cy="702733"/>
           </a:xfrm>
           <a:prstGeom prst="rect">
@@ -4690,7 +4731,7 @@
         </p:nvSpPr>
         <p:spPr>
           <a:xfrm>
-            <a:off x="5212006" y="5207445"/>
+            <a:off x="5499874" y="5207445"/>
             <a:ext cx="1150718" cy="702733"/>
           </a:xfrm>
           <a:prstGeom prst="rect">
@@ -4751,8 +4792,8 @@
         </p:nvCxnSpPr>
         <p:spPr>
           <a:xfrm flipV="1">
-            <a:off x="4510993" y="4792133"/>
-            <a:ext cx="390456" cy="415313"/>
+            <a:off x="4798861" y="4792133"/>
+            <a:ext cx="102588" cy="415313"/>
           </a:xfrm>
           <a:prstGeom prst="straightConnector1">
             <a:avLst/>
@@ -4794,7 +4835,7 @@
         <p:spPr>
           <a:xfrm flipH="1" flipV="1">
             <a:off x="4901449" y="4792133"/>
-            <a:ext cx="885916" cy="415312"/>
+            <a:ext cx="1173784" cy="415312"/>
           </a:xfrm>
           <a:prstGeom prst="straightConnector1">
             <a:avLst/>
@@ -4832,7 +4873,7 @@
         </p:nvSpPr>
         <p:spPr>
           <a:xfrm>
-            <a:off x="7542673" y="4960997"/>
+            <a:off x="8533273" y="5003331"/>
             <a:ext cx="1320800" cy="492901"/>
           </a:xfrm>
           <a:prstGeom prst="rect">
@@ -4881,8 +4922,8 @@
         </p:nvSpPr>
         <p:spPr>
           <a:xfrm>
-            <a:off x="6712567" y="5869211"/>
-            <a:ext cx="1620385" cy="839562"/>
+            <a:off x="6712567" y="5869210"/>
+            <a:ext cx="1620385" cy="921057"/>
           </a:xfrm>
           <a:prstGeom prst="rect">
             <a:avLst/>
@@ -4918,7 +4959,7 @@
           <a:p>
             <a:pPr algn="ctr"/>
             <a:r>
-              <a:rPr lang="en-US" dirty="0"/>
+              <a:rPr lang="en-US" sz="1100" dirty="0"/>
               <a:t>-value: Int</a:t>
             </a:r>
           </a:p>
@@ -4932,7 +4973,22 @@
               <a:rPr lang="en-US" dirty="0"/>
               <a:t>()</a:t>
             </a:r>
-            <a:endParaRPr lang="ro-RO" dirty="0"/>
+          </a:p>
+          <a:p>
+            <a:pPr algn="ctr"/>
+            <a:r>
+              <a:rPr lang="en-US" dirty="0">
+                <a:highlight>
+                  <a:srgbClr val="FF0000"/>
+                </a:highlight>
+              </a:rPr>
+              <a:t>equals()</a:t>
+            </a:r>
+            <a:endParaRPr lang="ro-RO" dirty="0">
+              <a:highlight>
+                <a:srgbClr val="FF0000"/>
+              </a:highlight>
+            </a:endParaRPr>
           </a:p>
         </p:txBody>
       </p:sp>
@@ -4950,8 +5006,8 @@
         </p:nvSpPr>
         <p:spPr>
           <a:xfrm>
-            <a:off x="8513630" y="5869210"/>
-            <a:ext cx="2152642" cy="921057"/>
+            <a:off x="8384754" y="5828463"/>
+            <a:ext cx="1620385" cy="921057"/>
           </a:xfrm>
           <a:prstGeom prst="rect">
             <a:avLst/>
@@ -4987,7 +5043,7 @@
           <a:p>
             <a:pPr algn="ctr"/>
             <a:r>
-              <a:rPr lang="en-US" dirty="0"/>
+              <a:rPr lang="en-US" sz="1100" dirty="0"/>
               <a:t>-value: Bool</a:t>
             </a:r>
           </a:p>
@@ -5001,7 +5057,22 @@
               <a:rPr lang="en-US" dirty="0"/>
               <a:t>()</a:t>
             </a:r>
-            <a:endParaRPr lang="ro-RO" dirty="0"/>
+          </a:p>
+          <a:p>
+            <a:pPr algn="ctr"/>
+            <a:r>
+              <a:rPr lang="en-US" dirty="0">
+                <a:highlight>
+                  <a:srgbClr val="FF0000"/>
+                </a:highlight>
+              </a:rPr>
+              <a:t>equals()</a:t>
+            </a:r>
+            <a:endParaRPr lang="ro-RO" dirty="0">
+              <a:highlight>
+                <a:srgbClr val="FF0000"/>
+              </a:highlight>
+            </a:endParaRPr>
           </a:p>
         </p:txBody>
       </p:sp>
@@ -5023,8 +5094,8 @@
         </p:nvCxnSpPr>
         <p:spPr>
           <a:xfrm flipV="1">
-            <a:off x="7522760" y="5453898"/>
-            <a:ext cx="680313" cy="415313"/>
+            <a:off x="7522760" y="5496232"/>
+            <a:ext cx="1670913" cy="372978"/>
           </a:xfrm>
           <a:prstGeom prst="straightConnector1">
             <a:avLst/>
@@ -5066,8 +5137,8 @@
         </p:nvCxnSpPr>
         <p:spPr>
           <a:xfrm flipH="1" flipV="1">
-            <a:off x="8203073" y="5453898"/>
-            <a:ext cx="1386878" cy="415312"/>
+            <a:off x="9193673" y="5496232"/>
+            <a:ext cx="1274" cy="332231"/>
           </a:xfrm>
           <a:prstGeom prst="straightConnector1">
             <a:avLst/>
@@ -5105,7 +5176,7 @@
         </p:nvSpPr>
         <p:spPr>
           <a:xfrm>
-            <a:off x="10363199" y="1763583"/>
+            <a:off x="10337165" y="1761866"/>
             <a:ext cx="1320801" cy="1008543"/>
           </a:xfrm>
           <a:prstGeom prst="rect">
@@ -5264,9 +5335,9 @@
           <p:nvPr/>
         </p:nvCxnSpPr>
         <p:spPr>
-          <a:xfrm flipV="1">
-            <a:off x="11023600" y="2772126"/>
-            <a:ext cx="0" cy="361143"/>
+          <a:xfrm flipH="1" flipV="1">
+            <a:off x="10997566" y="2770409"/>
+            <a:ext cx="26034" cy="362860"/>
           </a:xfrm>
           <a:prstGeom prst="straightConnector1">
             <a:avLst/>
@@ -5290,6 +5361,572 @@
           </a:fontRef>
         </p:style>
       </p:cxnSp>
+      <p:sp>
+        <p:nvSpPr>
+          <p:cNvPr id="2" name="Rectangle 1">
+            <a:extLst>
+              <a:ext uri="{FF2B5EF4-FFF2-40B4-BE49-F238E27FC236}">
+                <a16:creationId xmlns:a16="http://schemas.microsoft.com/office/drawing/2014/main" id="{FAF638FE-8AC1-8F8A-91B5-BD3697FEFE85}"/>
+              </a:ext>
+            </a:extLst>
+          </p:cNvPr>
+          <p:cNvSpPr/>
+          <p:nvPr/>
+        </p:nvSpPr>
+        <p:spPr>
+          <a:xfrm>
+            <a:off x="10098639" y="5828462"/>
+            <a:ext cx="1620385" cy="921057"/>
+          </a:xfrm>
+          <a:prstGeom prst="rect">
+            <a:avLst/>
+          </a:prstGeom>
+        </p:spPr>
+        <p:style>
+          <a:lnRef idx="2">
+            <a:schemeClr val="accent1">
+              <a:shade val="50000"/>
+            </a:schemeClr>
+          </a:lnRef>
+          <a:fillRef idx="1">
+            <a:schemeClr val="accent1"/>
+          </a:fillRef>
+          <a:effectRef idx="0">
+            <a:schemeClr val="accent1"/>
+          </a:effectRef>
+          <a:fontRef idx="minor">
+            <a:schemeClr val="lt1"/>
+          </a:fontRef>
+        </p:style>
+        <p:txBody>
+          <a:bodyPr rtlCol="0" anchor="ctr"/>
+          <a:lstStyle/>
+          <a:p>
+            <a:pPr algn="ctr"/>
+            <a:r>
+              <a:rPr lang="en-US" dirty="0" err="1">
+                <a:highlight>
+                  <a:srgbClr val="FF0000"/>
+                </a:highlight>
+              </a:rPr>
+              <a:t>StringValue</a:t>
+            </a:r>
+            <a:endParaRPr lang="en-US" dirty="0">
+              <a:highlight>
+                <a:srgbClr val="FF0000"/>
+              </a:highlight>
+            </a:endParaRPr>
+          </a:p>
+          <a:p>
+            <a:pPr algn="ctr"/>
+            <a:r>
+              <a:rPr lang="en-US" sz="1100" dirty="0">
+                <a:highlight>
+                  <a:srgbClr val="FF0000"/>
+                </a:highlight>
+              </a:rPr>
+              <a:t>-value: String</a:t>
+            </a:r>
+          </a:p>
+          <a:p>
+            <a:pPr algn="ctr"/>
+            <a:r>
+              <a:rPr lang="en-US" dirty="0" err="1">
+                <a:highlight>
+                  <a:srgbClr val="FF0000"/>
+                </a:highlight>
+              </a:rPr>
+              <a:t>getType</a:t>
+            </a:r>
+            <a:r>
+              <a:rPr lang="en-US" dirty="0">
+                <a:highlight>
+                  <a:srgbClr val="FF0000"/>
+                </a:highlight>
+              </a:rPr>
+              <a:t>()</a:t>
+            </a:r>
+          </a:p>
+          <a:p>
+            <a:pPr algn="ctr"/>
+            <a:r>
+              <a:rPr lang="en-US" dirty="0">
+                <a:highlight>
+                  <a:srgbClr val="FF0000"/>
+                </a:highlight>
+              </a:rPr>
+              <a:t>equals()</a:t>
+            </a:r>
+            <a:endParaRPr lang="ro-RO" dirty="0">
+              <a:highlight>
+                <a:srgbClr val="FF0000"/>
+              </a:highlight>
+            </a:endParaRPr>
+          </a:p>
+        </p:txBody>
+      </p:sp>
+      <p:sp>
+        <p:nvSpPr>
+          <p:cNvPr id="5" name="Rectangle 4">
+            <a:extLst>
+              <a:ext uri="{FF2B5EF4-FFF2-40B4-BE49-F238E27FC236}">
+                <a16:creationId xmlns:a16="http://schemas.microsoft.com/office/drawing/2014/main" id="{835867CA-C41C-711E-E013-333AABA2456F}"/>
+              </a:ext>
+            </a:extLst>
+          </p:cNvPr>
+          <p:cNvSpPr/>
+          <p:nvPr/>
+        </p:nvSpPr>
+        <p:spPr>
+          <a:xfrm>
+            <a:off x="2958350" y="5202374"/>
+            <a:ext cx="1229336" cy="702733"/>
+          </a:xfrm>
+          <a:prstGeom prst="rect">
+            <a:avLst/>
+          </a:prstGeom>
+        </p:spPr>
+        <p:style>
+          <a:lnRef idx="2">
+            <a:schemeClr val="accent1">
+              <a:shade val="50000"/>
+            </a:schemeClr>
+          </a:lnRef>
+          <a:fillRef idx="1">
+            <a:schemeClr val="accent1"/>
+          </a:fillRef>
+          <a:effectRef idx="0">
+            <a:schemeClr val="accent1"/>
+          </a:effectRef>
+          <a:fontRef idx="minor">
+            <a:schemeClr val="lt1"/>
+          </a:fontRef>
+        </p:style>
+        <p:txBody>
+          <a:bodyPr rtlCol="0" anchor="ctr"/>
+          <a:lstStyle/>
+          <a:p>
+            <a:pPr algn="ctr"/>
+            <a:r>
+              <a:rPr lang="en-US" dirty="0" err="1">
+                <a:highlight>
+                  <a:srgbClr val="FF0000"/>
+                </a:highlight>
+              </a:rPr>
+              <a:t>StringType</a:t>
+            </a:r>
+            <a:endParaRPr lang="en-US" dirty="0">
+              <a:highlight>
+                <a:srgbClr val="FF0000"/>
+              </a:highlight>
+            </a:endParaRPr>
+          </a:p>
+          <a:p>
+            <a:pPr algn="ctr"/>
+            <a:r>
+              <a:rPr lang="en-US" dirty="0">
+                <a:highlight>
+                  <a:srgbClr val="FF0000"/>
+                </a:highlight>
+              </a:rPr>
+              <a:t>equals()</a:t>
+            </a:r>
+            <a:endParaRPr lang="ro-RO" dirty="0">
+              <a:highlight>
+                <a:srgbClr val="FF0000"/>
+              </a:highlight>
+            </a:endParaRPr>
+          </a:p>
+        </p:txBody>
+      </p:sp>
+      <p:cxnSp>
+        <p:nvCxnSpPr>
+          <p:cNvPr id="12" name="Straight Arrow Connector 11">
+            <a:extLst>
+              <a:ext uri="{FF2B5EF4-FFF2-40B4-BE49-F238E27FC236}">
+                <a16:creationId xmlns:a16="http://schemas.microsoft.com/office/drawing/2014/main" id="{AB8B79C8-AC4E-94F9-72EC-4A34077C86AB}"/>
+              </a:ext>
+            </a:extLst>
+          </p:cNvPr>
+          <p:cNvCxnSpPr>
+            <a:stCxn id="5" idx="0"/>
+            <a:endCxn id="54" idx="2"/>
+          </p:cNvCxnSpPr>
+          <p:nvPr/>
+        </p:nvCxnSpPr>
+        <p:spPr>
+          <a:xfrm flipV="1">
+            <a:off x="3573018" y="4792133"/>
+            <a:ext cx="1328431" cy="410241"/>
+          </a:xfrm>
+          <a:prstGeom prst="straightConnector1">
+            <a:avLst/>
+          </a:prstGeom>
+          <a:ln>
+            <a:tailEnd type="triangle"/>
+          </a:ln>
+        </p:spPr>
+        <p:style>
+          <a:lnRef idx="1">
+            <a:schemeClr val="accent1"/>
+          </a:lnRef>
+          <a:fillRef idx="0">
+            <a:schemeClr val="accent1"/>
+          </a:fillRef>
+          <a:effectRef idx="0">
+            <a:schemeClr val="accent1"/>
+          </a:effectRef>
+          <a:fontRef idx="minor">
+            <a:schemeClr val="tx1"/>
+          </a:fontRef>
+        </p:style>
+      </p:cxnSp>
+      <p:cxnSp>
+        <p:nvCxnSpPr>
+          <p:cNvPr id="17" name="Straight Arrow Connector 16">
+            <a:extLst>
+              <a:ext uri="{FF2B5EF4-FFF2-40B4-BE49-F238E27FC236}">
+                <a16:creationId xmlns:a16="http://schemas.microsoft.com/office/drawing/2014/main" id="{29F4CBEF-9E43-A632-F132-04A30021A41F}"/>
+              </a:ext>
+            </a:extLst>
+          </p:cNvPr>
+          <p:cNvCxnSpPr>
+            <a:stCxn id="2" idx="0"/>
+            <a:endCxn id="61" idx="2"/>
+          </p:cNvCxnSpPr>
+          <p:nvPr/>
+        </p:nvCxnSpPr>
+        <p:spPr>
+          <a:xfrm flipH="1" flipV="1">
+            <a:off x="9193673" y="5496232"/>
+            <a:ext cx="1715159" cy="332230"/>
+          </a:xfrm>
+          <a:prstGeom prst="straightConnector1">
+            <a:avLst/>
+          </a:prstGeom>
+          <a:ln>
+            <a:tailEnd type="triangle"/>
+          </a:ln>
+        </p:spPr>
+        <p:style>
+          <a:lnRef idx="1">
+            <a:schemeClr val="accent1"/>
+          </a:lnRef>
+          <a:fillRef idx="0">
+            <a:schemeClr val="accent1"/>
+          </a:fillRef>
+          <a:effectRef idx="0">
+            <a:schemeClr val="accent1"/>
+          </a:effectRef>
+          <a:fontRef idx="minor">
+            <a:schemeClr val="tx1"/>
+          </a:fontRef>
+        </p:style>
+      </p:cxnSp>
+      <p:sp>
+        <p:nvSpPr>
+          <p:cNvPr id="20" name="Rectangle 19">
+            <a:extLst>
+              <a:ext uri="{FF2B5EF4-FFF2-40B4-BE49-F238E27FC236}">
+                <a16:creationId xmlns:a16="http://schemas.microsoft.com/office/drawing/2014/main" id="{128A0D57-6C19-F1AB-515C-11BCBE32AA8C}"/>
+              </a:ext>
+            </a:extLst>
+          </p:cNvPr>
+          <p:cNvSpPr/>
+          <p:nvPr/>
+        </p:nvSpPr>
+        <p:spPr>
+          <a:xfrm>
+            <a:off x="107837" y="5178529"/>
+            <a:ext cx="1946821" cy="1299866"/>
+          </a:xfrm>
+          <a:prstGeom prst="rect">
+            <a:avLst/>
+          </a:prstGeom>
+        </p:spPr>
+        <p:style>
+          <a:lnRef idx="2">
+            <a:schemeClr val="accent1">
+              <a:shade val="50000"/>
+            </a:schemeClr>
+          </a:lnRef>
+          <a:fillRef idx="1">
+            <a:schemeClr val="accent1"/>
+          </a:fillRef>
+          <a:effectRef idx="0">
+            <a:schemeClr val="accent1"/>
+          </a:effectRef>
+          <a:fontRef idx="minor">
+            <a:schemeClr val="lt1"/>
+          </a:fontRef>
+        </p:style>
+        <p:txBody>
+          <a:bodyPr rtlCol="0" anchor="ctr"/>
+          <a:lstStyle/>
+          <a:p>
+            <a:pPr algn="ctr"/>
+            <a:r>
+              <a:rPr lang="en-US" dirty="0" err="1">
+                <a:highlight>
+                  <a:srgbClr val="FF0000"/>
+                </a:highlight>
+              </a:rPr>
+              <a:t>openRFile</a:t>
+            </a:r>
+            <a:r>
+              <a:rPr lang="en-US" dirty="0">
+                <a:highlight>
+                  <a:srgbClr val="FF0000"/>
+                </a:highlight>
+              </a:rPr>
+              <a:t>(exp)</a:t>
+            </a:r>
+          </a:p>
+          <a:p>
+            <a:pPr algn="ctr"/>
+            <a:r>
+              <a:rPr lang="en-US" dirty="0" err="1">
+                <a:highlight>
+                  <a:srgbClr val="FF0000"/>
+                </a:highlight>
+              </a:rPr>
+              <a:t>readFile</a:t>
+            </a:r>
+            <a:r>
+              <a:rPr lang="en-US" dirty="0">
+                <a:highlight>
+                  <a:srgbClr val="FF0000"/>
+                </a:highlight>
+              </a:rPr>
+              <a:t>(exp, var)</a:t>
+            </a:r>
+          </a:p>
+          <a:p>
+            <a:pPr algn="ctr"/>
+            <a:r>
+              <a:rPr lang="en-US" dirty="0" err="1">
+                <a:highlight>
+                  <a:srgbClr val="FF0000"/>
+                </a:highlight>
+              </a:rPr>
+              <a:t>closeRFile</a:t>
+            </a:r>
+            <a:r>
+              <a:rPr lang="en-US" dirty="0">
+                <a:highlight>
+                  <a:srgbClr val="FF0000"/>
+                </a:highlight>
+              </a:rPr>
+              <a:t>(exp)</a:t>
+            </a:r>
+            <a:endParaRPr lang="ro-RO" dirty="0">
+              <a:highlight>
+                <a:srgbClr val="FF0000"/>
+              </a:highlight>
+            </a:endParaRPr>
+          </a:p>
+        </p:txBody>
+      </p:sp>
+      <p:cxnSp>
+        <p:nvCxnSpPr>
+          <p:cNvPr id="22" name="Straight Arrow Connector 21">
+            <a:extLst>
+              <a:ext uri="{FF2B5EF4-FFF2-40B4-BE49-F238E27FC236}">
+                <a16:creationId xmlns:a16="http://schemas.microsoft.com/office/drawing/2014/main" id="{46D4BDDB-EF1F-9EBA-AE7C-7848EFE42720}"/>
+              </a:ext>
+            </a:extLst>
+          </p:cNvPr>
+          <p:cNvCxnSpPr>
+            <a:stCxn id="20" idx="0"/>
+            <a:endCxn id="16" idx="2"/>
+          </p:cNvCxnSpPr>
+          <p:nvPr/>
+        </p:nvCxnSpPr>
+        <p:spPr>
+          <a:xfrm flipV="1">
+            <a:off x="1081248" y="993801"/>
+            <a:ext cx="232319" cy="4184728"/>
+          </a:xfrm>
+          <a:prstGeom prst="straightConnector1">
+            <a:avLst/>
+          </a:prstGeom>
+          <a:ln>
+            <a:tailEnd type="triangle"/>
+          </a:ln>
+        </p:spPr>
+        <p:style>
+          <a:lnRef idx="1">
+            <a:schemeClr val="accent1"/>
+          </a:lnRef>
+          <a:fillRef idx="0">
+            <a:schemeClr val="accent1"/>
+          </a:fillRef>
+          <a:effectRef idx="0">
+            <a:schemeClr val="accent1"/>
+          </a:effectRef>
+          <a:fontRef idx="minor">
+            <a:schemeClr val="tx1"/>
+          </a:fontRef>
+        </p:style>
+      </p:cxnSp>
+      <p:sp>
+        <p:nvSpPr>
+          <p:cNvPr id="23" name="Rectangle 22">
+            <a:extLst>
+              <a:ext uri="{FF2B5EF4-FFF2-40B4-BE49-F238E27FC236}">
+                <a16:creationId xmlns:a16="http://schemas.microsoft.com/office/drawing/2014/main" id="{79B7F1D9-2CF2-1FCD-028A-42A7BF79F9F3}"/>
+              </a:ext>
+            </a:extLst>
+          </p:cNvPr>
+          <p:cNvSpPr/>
+          <p:nvPr/>
+        </p:nvSpPr>
+        <p:spPr>
+          <a:xfrm>
+            <a:off x="6786575" y="3579753"/>
+            <a:ext cx="1914942" cy="702733"/>
+          </a:xfrm>
+          <a:prstGeom prst="rect">
+            <a:avLst/>
+          </a:prstGeom>
+        </p:spPr>
+        <p:style>
+          <a:lnRef idx="2">
+            <a:schemeClr val="accent1">
+              <a:shade val="50000"/>
+            </a:schemeClr>
+          </a:lnRef>
+          <a:fillRef idx="1">
+            <a:schemeClr val="accent1"/>
+          </a:fillRef>
+          <a:effectRef idx="0">
+            <a:schemeClr val="accent1"/>
+          </a:effectRef>
+          <a:fontRef idx="minor">
+            <a:schemeClr val="lt1"/>
+          </a:fontRef>
+        </p:style>
+        <p:txBody>
+          <a:bodyPr rtlCol="0" anchor="ctr"/>
+          <a:lstStyle/>
+          <a:p>
+            <a:pPr algn="ctr"/>
+            <a:r>
+              <a:rPr lang="en-US" dirty="0">
+                <a:highlight>
+                  <a:srgbClr val="FF0000"/>
+                </a:highlight>
+              </a:rPr>
+              <a:t>Relational exp </a:t>
+            </a:r>
+            <a:r>
+              <a:rPr lang="en-US" sz="1200" dirty="0">
+                <a:highlight>
+                  <a:srgbClr val="FF0000"/>
+                </a:highlight>
+              </a:rPr>
+              <a:t>(exp1&lt;/&lt;=/==/!=/&gt;/&gt;=exp2)</a:t>
+            </a:r>
+            <a:endParaRPr lang="ro-RO" sz="1200" dirty="0">
+              <a:highlight>
+                <a:srgbClr val="FF0000"/>
+              </a:highlight>
+            </a:endParaRPr>
+          </a:p>
+        </p:txBody>
+      </p:sp>
+      <p:cxnSp>
+        <p:nvCxnSpPr>
+          <p:cNvPr id="48" name="Straight Arrow Connector 47">
+            <a:extLst>
+              <a:ext uri="{FF2B5EF4-FFF2-40B4-BE49-F238E27FC236}">
+                <a16:creationId xmlns:a16="http://schemas.microsoft.com/office/drawing/2014/main" id="{98044F1F-49DC-0E8C-2F76-A06F1CDBBD02}"/>
+              </a:ext>
+            </a:extLst>
+          </p:cNvPr>
+          <p:cNvCxnSpPr>
+            <a:stCxn id="23" idx="0"/>
+            <a:endCxn id="31" idx="2"/>
+          </p:cNvCxnSpPr>
+          <p:nvPr/>
+        </p:nvCxnSpPr>
+        <p:spPr>
+          <a:xfrm flipH="1" flipV="1">
+            <a:off x="7346816" y="1327202"/>
+            <a:ext cx="397230" cy="2252551"/>
+          </a:xfrm>
+          <a:prstGeom prst="straightConnector1">
+            <a:avLst/>
+          </a:prstGeom>
+          <a:ln>
+            <a:tailEnd type="triangle"/>
+          </a:ln>
+        </p:spPr>
+        <p:style>
+          <a:lnRef idx="1">
+            <a:schemeClr val="accent1"/>
+          </a:lnRef>
+          <a:fillRef idx="0">
+            <a:schemeClr val="accent1"/>
+          </a:fillRef>
+          <a:effectRef idx="0">
+            <a:schemeClr val="accent1"/>
+          </a:effectRef>
+          <a:fontRef idx="minor">
+            <a:schemeClr val="tx1"/>
+          </a:fontRef>
+        </p:style>
+      </p:cxnSp>
+      <p:sp>
+        <p:nvSpPr>
+          <p:cNvPr id="50" name="TextBox 49">
+            <a:extLst>
+              <a:ext uri="{FF2B5EF4-FFF2-40B4-BE49-F238E27FC236}">
+                <a16:creationId xmlns:a16="http://schemas.microsoft.com/office/drawing/2014/main" id="{005A4BBA-578D-7152-0F57-622BBE96886F}"/>
+              </a:ext>
+            </a:extLst>
+          </p:cNvPr>
+          <p:cNvSpPr txBox="1"/>
+          <p:nvPr/>
+        </p:nvSpPr>
+        <p:spPr>
+          <a:xfrm>
+            <a:off x="2936174" y="412802"/>
+            <a:ext cx="1675459" cy="369332"/>
+          </a:xfrm>
+          <a:prstGeom prst="rect">
+            <a:avLst/>
+          </a:prstGeom>
+          <a:noFill/>
+        </p:spPr>
+        <p:txBody>
+          <a:bodyPr wrap="none" rtlCol="0">
+            <a:spAutoFit/>
+          </a:bodyPr>
+          <a:lstStyle/>
+          <a:p>
+            <a:r>
+              <a:rPr lang="en-US" dirty="0">
+                <a:solidFill>
+                  <a:schemeClr val="bg1"/>
+                </a:solidFill>
+                <a:highlight>
+                  <a:srgbClr val="FF0000"/>
+                </a:highlight>
+              </a:rPr>
+              <a:t>ASSIGNMENT 3</a:t>
+            </a:r>
+            <a:endParaRPr lang="ro-RO" dirty="0">
+              <a:solidFill>
+                <a:schemeClr val="bg1"/>
+              </a:solidFill>
+              <a:highlight>
+                <a:srgbClr val="FF0000"/>
+              </a:highlight>
+            </a:endParaRPr>
+          </a:p>
+        </p:txBody>
+      </p:sp>
     </p:spTree>
     <p:extLst>
       <p:ext uri="{BB962C8B-B14F-4D97-AF65-F5344CB8AC3E}">
@@ -5334,7 +5971,7 @@
         </p:nvSpPr>
         <p:spPr>
           <a:xfrm>
-            <a:off x="5021198" y="1245738"/>
+            <a:off x="6982603" y="1079022"/>
             <a:ext cx="1320800" cy="2437263"/>
           </a:xfrm>
           <a:prstGeom prst="rect">
@@ -5417,7 +6054,7 @@
         </p:nvSpPr>
         <p:spPr>
           <a:xfrm>
-            <a:off x="4903338" y="539355"/>
+            <a:off x="6926876" y="539355"/>
             <a:ext cx="1447127" cy="369332"/>
           </a:xfrm>
           <a:prstGeom prst="rect">
@@ -5453,8 +6090,8 @@
         </p:nvSpPr>
         <p:spPr>
           <a:xfrm>
-            <a:off x="7699747" y="1101804"/>
-            <a:ext cx="1786002" cy="2437263"/>
+            <a:off x="9723285" y="1101804"/>
+            <a:ext cx="1943786" cy="2437263"/>
           </a:xfrm>
           <a:prstGeom prst="rect">
             <a:avLst/>
@@ -5526,6 +6163,25 @@
               <a:t>remove()</a:t>
             </a:r>
           </a:p>
+          <a:p>
+            <a:pPr algn="ctr"/>
+            <a:r>
+              <a:rPr lang="en-US" dirty="0" err="1">
+                <a:highlight>
+                  <a:srgbClr val="FF0000"/>
+                </a:highlight>
+              </a:rPr>
+              <a:t>logPrgStateExec</a:t>
+            </a:r>
+            <a:r>
+              <a:rPr lang="en-US" dirty="0">
+                <a:highlight>
+                  <a:srgbClr val="FF0000"/>
+                </a:highlight>
+              </a:rPr>
+              <a:t>()</a:t>
+            </a:r>
+          </a:p>
         </p:txBody>
       </p:sp>
       <p:sp>
@@ -5542,7 +6198,7 @@
         </p:nvSpPr>
         <p:spPr>
           <a:xfrm>
-            <a:off x="7900539" y="530888"/>
+            <a:off x="9924077" y="530888"/>
             <a:ext cx="1384418" cy="369332"/>
           </a:xfrm>
           <a:prstGeom prst="rect">
@@ -5578,8 +6234,8 @@
         </p:nvSpPr>
         <p:spPr>
           <a:xfrm>
-            <a:off x="1500624" y="1127204"/>
-            <a:ext cx="1786001" cy="2437263"/>
+            <a:off x="3197540" y="981824"/>
+            <a:ext cx="1786001" cy="846976"/>
           </a:xfrm>
           <a:prstGeom prst="rect">
             <a:avLst/>
@@ -5608,58 +6264,28 @@
             <a:pPr algn="ctr"/>
             <a:r>
               <a:rPr lang="en-US" dirty="0"/>
-              <a:t>View</a:t>
+              <a:t>Command</a:t>
+            </a:r>
+          </a:p>
+          <a:p>
+            <a:pPr algn="ctr"/>
+            <a:r>
+              <a:rPr lang="en-US" sz="1100" dirty="0"/>
+              <a:t>-key</a:t>
+            </a:r>
+          </a:p>
+          <a:p>
+            <a:pPr algn="ctr"/>
+            <a:r>
+              <a:rPr lang="en-US" sz="1100" dirty="0"/>
+              <a:t>-description</a:t>
             </a:r>
           </a:p>
           <a:p>
             <a:pPr algn="ctr"/>
             <a:r>
               <a:rPr lang="en-US" dirty="0"/>
-              <a:t>-controller</a:t>
-            </a:r>
-          </a:p>
-          <a:p>
-            <a:pPr algn="ctr"/>
-            <a:r>
-              <a:rPr lang="en-US" dirty="0" err="1"/>
-              <a:t>showMenu</a:t>
-            </a:r>
-            <a:r>
-              <a:rPr lang="en-US" dirty="0"/>
-              <a:t>()</a:t>
-            </a:r>
-          </a:p>
-          <a:p>
-            <a:pPr algn="ctr"/>
-            <a:r>
-              <a:rPr lang="en-US" dirty="0" err="1"/>
-              <a:t>oneStep</a:t>
-            </a:r>
-            <a:r>
-              <a:rPr lang="en-US" dirty="0"/>
-              <a:t>()</a:t>
-            </a:r>
-          </a:p>
-          <a:p>
-            <a:pPr algn="ctr"/>
-            <a:r>
-              <a:rPr lang="en-US" dirty="0" err="1"/>
-              <a:t>fullRun</a:t>
-            </a:r>
-            <a:r>
-              <a:rPr lang="en-US" dirty="0"/>
-              <a:t>()</a:t>
-            </a:r>
-          </a:p>
-          <a:p>
-            <a:pPr algn="ctr"/>
-            <a:r>
-              <a:rPr lang="en-US" dirty="0" err="1"/>
-              <a:t>loadCode</a:t>
-            </a:r>
-            <a:r>
-              <a:rPr lang="en-US" dirty="0"/>
-              <a:t>()</a:t>
+              <a:t>execute()</a:t>
             </a:r>
           </a:p>
         </p:txBody>
@@ -5678,7 +6304,7 @@
         </p:nvSpPr>
         <p:spPr>
           <a:xfrm>
-            <a:off x="2041606" y="715554"/>
+            <a:off x="3029836" y="439037"/>
             <a:ext cx="704039" cy="369332"/>
           </a:xfrm>
           <a:prstGeom prst="rect">
@@ -6187,6 +6813,328 @@
               <a:t>…</a:t>
             </a:r>
             <a:endParaRPr lang="ro-RO" b="1" dirty="0"/>
+          </a:p>
+        </p:txBody>
+      </p:sp>
+      <p:sp>
+        <p:nvSpPr>
+          <p:cNvPr id="7" name="Rectangle 6">
+            <a:extLst>
+              <a:ext uri="{FF2B5EF4-FFF2-40B4-BE49-F238E27FC236}">
+                <a16:creationId xmlns:a16="http://schemas.microsoft.com/office/drawing/2014/main" id="{F2ABCF05-EB27-59DD-E6E1-BE5A0025FF6E}"/>
+              </a:ext>
+            </a:extLst>
+          </p:cNvPr>
+          <p:cNvSpPr/>
+          <p:nvPr/>
+        </p:nvSpPr>
+        <p:spPr>
+          <a:xfrm>
+            <a:off x="524929" y="981824"/>
+            <a:ext cx="1786001" cy="1437658"/>
+          </a:xfrm>
+          <a:prstGeom prst="rect">
+            <a:avLst/>
+          </a:prstGeom>
+        </p:spPr>
+        <p:style>
+          <a:lnRef idx="2">
+            <a:schemeClr val="accent1">
+              <a:shade val="50000"/>
+            </a:schemeClr>
+          </a:lnRef>
+          <a:fillRef idx="1">
+            <a:schemeClr val="accent1"/>
+          </a:fillRef>
+          <a:effectRef idx="0">
+            <a:schemeClr val="accent1"/>
+          </a:effectRef>
+          <a:fontRef idx="minor">
+            <a:schemeClr val="lt1"/>
+          </a:fontRef>
+        </p:style>
+        <p:txBody>
+          <a:bodyPr rtlCol="0" anchor="ctr"/>
+          <a:lstStyle/>
+          <a:p>
+            <a:pPr algn="ctr"/>
+            <a:r>
+              <a:rPr lang="en-US" dirty="0" err="1"/>
+              <a:t>TextMenu</a:t>
+            </a:r>
+            <a:endParaRPr lang="en-US" dirty="0"/>
+          </a:p>
+          <a:p>
+            <a:pPr algn="ctr"/>
+            <a:r>
+              <a:rPr lang="en-US" dirty="0"/>
+              <a:t>-commands</a:t>
+            </a:r>
+          </a:p>
+          <a:p>
+            <a:pPr algn="ctr"/>
+            <a:r>
+              <a:rPr lang="en-US" dirty="0" err="1"/>
+              <a:t>addCommand</a:t>
+            </a:r>
+            <a:r>
+              <a:rPr lang="en-US" dirty="0"/>
+              <a:t>()</a:t>
+            </a:r>
+          </a:p>
+          <a:p>
+            <a:pPr algn="ctr"/>
+            <a:r>
+              <a:rPr lang="en-US" dirty="0" err="1"/>
+              <a:t>printMenu</a:t>
+            </a:r>
+            <a:r>
+              <a:rPr lang="en-US" dirty="0"/>
+              <a:t>()</a:t>
+            </a:r>
+          </a:p>
+          <a:p>
+            <a:pPr algn="ctr"/>
+            <a:r>
+              <a:rPr lang="en-US" dirty="0"/>
+              <a:t>show()</a:t>
+            </a:r>
+          </a:p>
+        </p:txBody>
+      </p:sp>
+      <p:sp>
+        <p:nvSpPr>
+          <p:cNvPr id="8" name="Rectangle 7">
+            <a:extLst>
+              <a:ext uri="{FF2B5EF4-FFF2-40B4-BE49-F238E27FC236}">
+                <a16:creationId xmlns:a16="http://schemas.microsoft.com/office/drawing/2014/main" id="{0859994F-114D-E38B-0351-11D9BE5A43B5}"/>
+              </a:ext>
+            </a:extLst>
+          </p:cNvPr>
+          <p:cNvSpPr/>
+          <p:nvPr/>
+        </p:nvSpPr>
+        <p:spPr>
+          <a:xfrm>
+            <a:off x="2879752" y="2056270"/>
+            <a:ext cx="1302069" cy="667960"/>
+          </a:xfrm>
+          <a:prstGeom prst="rect">
+            <a:avLst/>
+          </a:prstGeom>
+        </p:spPr>
+        <p:style>
+          <a:lnRef idx="2">
+            <a:schemeClr val="accent1">
+              <a:shade val="50000"/>
+            </a:schemeClr>
+          </a:lnRef>
+          <a:fillRef idx="1">
+            <a:schemeClr val="accent1"/>
+          </a:fillRef>
+          <a:effectRef idx="0">
+            <a:schemeClr val="accent1"/>
+          </a:effectRef>
+          <a:fontRef idx="minor">
+            <a:schemeClr val="lt1"/>
+          </a:fontRef>
+        </p:style>
+        <p:txBody>
+          <a:bodyPr rtlCol="0" anchor="ctr"/>
+          <a:lstStyle/>
+          <a:p>
+            <a:pPr algn="ctr"/>
+            <a:r>
+              <a:rPr lang="en-US" dirty="0" err="1"/>
+              <a:t>ExitCmd</a:t>
+            </a:r>
+            <a:endParaRPr lang="en-US" dirty="0"/>
+          </a:p>
+        </p:txBody>
+      </p:sp>
+      <p:sp>
+        <p:nvSpPr>
+          <p:cNvPr id="9" name="Rectangle 8">
+            <a:extLst>
+              <a:ext uri="{FF2B5EF4-FFF2-40B4-BE49-F238E27FC236}">
+                <a16:creationId xmlns:a16="http://schemas.microsoft.com/office/drawing/2014/main" id="{9E25E2F4-3C0E-1469-F7AD-60B3C533818C}"/>
+              </a:ext>
+            </a:extLst>
+          </p:cNvPr>
+          <p:cNvSpPr/>
+          <p:nvPr/>
+        </p:nvSpPr>
+        <p:spPr>
+          <a:xfrm>
+            <a:off x="4458027" y="2056270"/>
+            <a:ext cx="1143676" cy="667960"/>
+          </a:xfrm>
+          <a:prstGeom prst="rect">
+            <a:avLst/>
+          </a:prstGeom>
+        </p:spPr>
+        <p:style>
+          <a:lnRef idx="2">
+            <a:schemeClr val="accent1">
+              <a:shade val="50000"/>
+            </a:schemeClr>
+          </a:lnRef>
+          <a:fillRef idx="1">
+            <a:schemeClr val="accent1"/>
+          </a:fillRef>
+          <a:effectRef idx="0">
+            <a:schemeClr val="accent1"/>
+          </a:effectRef>
+          <a:fontRef idx="minor">
+            <a:schemeClr val="lt1"/>
+          </a:fontRef>
+        </p:style>
+        <p:txBody>
+          <a:bodyPr rtlCol="0" anchor="ctr"/>
+          <a:lstStyle/>
+          <a:p>
+            <a:pPr algn="ctr"/>
+            <a:r>
+              <a:rPr lang="en-US" dirty="0" err="1"/>
+              <a:t>RunCmd</a:t>
+            </a:r>
+            <a:endParaRPr lang="en-US" dirty="0"/>
+          </a:p>
+        </p:txBody>
+      </p:sp>
+      <p:cxnSp>
+        <p:nvCxnSpPr>
+          <p:cNvPr id="13" name="Straight Arrow Connector 12">
+            <a:extLst>
+              <a:ext uri="{FF2B5EF4-FFF2-40B4-BE49-F238E27FC236}">
+                <a16:creationId xmlns:a16="http://schemas.microsoft.com/office/drawing/2014/main" id="{B8E5E59F-4C28-7E03-1C72-829D5762AE1C}"/>
+              </a:ext>
+            </a:extLst>
+          </p:cNvPr>
+          <p:cNvCxnSpPr>
+            <a:stCxn id="8" idx="0"/>
+            <a:endCxn id="4" idx="2"/>
+          </p:cNvCxnSpPr>
+          <p:nvPr/>
+        </p:nvCxnSpPr>
+        <p:spPr>
+          <a:xfrm flipV="1">
+            <a:off x="3530787" y="1828800"/>
+            <a:ext cx="559754" cy="227470"/>
+          </a:xfrm>
+          <a:prstGeom prst="straightConnector1">
+            <a:avLst/>
+          </a:prstGeom>
+          <a:ln>
+            <a:tailEnd type="triangle"/>
+          </a:ln>
+        </p:spPr>
+        <p:style>
+          <a:lnRef idx="1">
+            <a:schemeClr val="accent1"/>
+          </a:lnRef>
+          <a:fillRef idx="0">
+            <a:schemeClr val="accent1"/>
+          </a:fillRef>
+          <a:effectRef idx="0">
+            <a:schemeClr val="accent1"/>
+          </a:effectRef>
+          <a:fontRef idx="minor">
+            <a:schemeClr val="tx1"/>
+          </a:fontRef>
+        </p:style>
+      </p:cxnSp>
+      <p:cxnSp>
+        <p:nvCxnSpPr>
+          <p:cNvPr id="16" name="Straight Arrow Connector 15">
+            <a:extLst>
+              <a:ext uri="{FF2B5EF4-FFF2-40B4-BE49-F238E27FC236}">
+                <a16:creationId xmlns:a16="http://schemas.microsoft.com/office/drawing/2014/main" id="{7686B918-6F7D-CAE2-B870-35B5D67E0227}"/>
+              </a:ext>
+            </a:extLst>
+          </p:cNvPr>
+          <p:cNvCxnSpPr>
+            <a:stCxn id="9" idx="0"/>
+            <a:endCxn id="4" idx="2"/>
+          </p:cNvCxnSpPr>
+          <p:nvPr/>
+        </p:nvCxnSpPr>
+        <p:spPr>
+          <a:xfrm flipH="1" flipV="1">
+            <a:off x="4090541" y="1828800"/>
+            <a:ext cx="939324" cy="227470"/>
+          </a:xfrm>
+          <a:prstGeom prst="straightConnector1">
+            <a:avLst/>
+          </a:prstGeom>
+          <a:ln>
+            <a:tailEnd type="triangle"/>
+          </a:ln>
+        </p:spPr>
+        <p:style>
+          <a:lnRef idx="1">
+            <a:schemeClr val="accent1"/>
+          </a:lnRef>
+          <a:fillRef idx="0">
+            <a:schemeClr val="accent1"/>
+          </a:fillRef>
+          <a:effectRef idx="0">
+            <a:schemeClr val="accent1"/>
+          </a:effectRef>
+          <a:fontRef idx="minor">
+            <a:schemeClr val="tx1"/>
+          </a:fontRef>
+        </p:style>
+      </p:cxnSp>
+      <p:sp>
+        <p:nvSpPr>
+          <p:cNvPr id="19" name="Rectangle 18">
+            <a:extLst>
+              <a:ext uri="{FF2B5EF4-FFF2-40B4-BE49-F238E27FC236}">
+                <a16:creationId xmlns:a16="http://schemas.microsoft.com/office/drawing/2014/main" id="{A06E7A89-0E1B-AF7E-794B-00C08B9BFD78}"/>
+              </a:ext>
+            </a:extLst>
+          </p:cNvPr>
+          <p:cNvSpPr/>
+          <p:nvPr/>
+        </p:nvSpPr>
+        <p:spPr>
+          <a:xfrm>
+            <a:off x="237067" y="321734"/>
+            <a:ext cx="5655733" cy="2997200"/>
+          </a:xfrm>
+          <a:prstGeom prst="rect">
+            <a:avLst/>
+          </a:prstGeom>
+          <a:noFill/>
+          <a:ln w="76200">
+            <a:solidFill>
+              <a:srgbClr val="FF0000"/>
+            </a:solidFill>
+          </a:ln>
+        </p:spPr>
+        <p:style>
+          <a:lnRef idx="2">
+            <a:schemeClr val="accent1">
+              <a:shade val="50000"/>
+            </a:schemeClr>
+          </a:lnRef>
+          <a:fillRef idx="1">
+            <a:schemeClr val="accent1"/>
+          </a:fillRef>
+          <a:effectRef idx="0">
+            <a:schemeClr val="accent1"/>
+          </a:effectRef>
+          <a:fontRef idx="minor">
+            <a:schemeClr val="lt1"/>
+          </a:fontRef>
+        </p:style>
+        <p:txBody>
+          <a:bodyPr rtlCol="0" anchor="ctr"/>
+          <a:lstStyle/>
+          <a:p>
+            <a:pPr algn="ctr"/>
+            <a:endParaRPr lang="ro-RO"/>
           </a:p>
         </p:txBody>
       </p:sp>

</xml_diff>